<commit_message>
new presentation version with my questions
</commit_message>
<xml_diff>
--- a/RECAP.pptx
+++ b/RECAP.pptx
@@ -2117,6 +2117,90 @@
     <p:extLst>
       <p:ext uri="{BB962C8B-B14F-4D97-AF65-F5344CB8AC3E}">
         <p14:creationId xmlns:p14="http://schemas.microsoft.com/office/powerpoint/2010/main" val="1766504201"/>
+      </p:ext>
+    </p:extLst>
+  </p:cSld>
+  <p:clrMapOvr>
+    <a:masterClrMapping/>
+  </p:clrMapOvr>
+</p:notes>
+</file>
+
+<file path=ppt/notesSlides/notesSlide7.xml><?xml version="1.0" encoding="utf-8"?>
+<p:notes xmlns:a="http://schemas.openxmlformats.org/drawingml/2006/main" xmlns:r="http://schemas.openxmlformats.org/officeDocument/2006/relationships" xmlns:p="http://schemas.openxmlformats.org/presentationml/2006/main">
+  <p:cSld>
+    <p:spTree>
+      <p:nvGrpSpPr>
+        <p:cNvPr id="1" name=""/>
+        <p:cNvGrpSpPr/>
+        <p:nvPr/>
+      </p:nvGrpSpPr>
+      <p:grpSpPr>
+        <a:xfrm>
+          <a:off x="0" y="0"/>
+          <a:ext cx="0" cy="0"/>
+          <a:chOff x="0" y="0"/>
+          <a:chExt cx="0" cy="0"/>
+        </a:xfrm>
+      </p:grpSpPr>
+      <p:sp>
+        <p:nvSpPr>
+          <p:cNvPr id="2" name="Folienbildplatzhalter 1"/>
+          <p:cNvSpPr>
+            <a:spLocks noGrp="1" noRot="1" noChangeAspect="1"/>
+          </p:cNvSpPr>
+          <p:nvPr>
+            <p:ph type="sldImg"/>
+          </p:nvPr>
+        </p:nvSpPr>
+        <p:spPr/>
+      </p:sp>
+      <p:sp>
+        <p:nvSpPr>
+          <p:cNvPr id="3" name="Notizenplatzhalter 2"/>
+          <p:cNvSpPr>
+            <a:spLocks noGrp="1"/>
+          </p:cNvSpPr>
+          <p:nvPr>
+            <p:ph type="body" idx="1"/>
+          </p:nvPr>
+        </p:nvSpPr>
+        <p:spPr/>
+        <p:txBody>
+          <a:bodyPr/>
+          <a:lstStyle/>
+          <a:p>
+            <a:endParaRPr lang="de-CH" baseline="0" dirty="0" smtClean="0"/>
+          </a:p>
+        </p:txBody>
+      </p:sp>
+      <p:sp>
+        <p:nvSpPr>
+          <p:cNvPr id="4" name="Foliennummernplatzhalter 3"/>
+          <p:cNvSpPr>
+            <a:spLocks noGrp="1"/>
+          </p:cNvSpPr>
+          <p:nvPr>
+            <p:ph type="sldNum" sz="quarter" idx="10"/>
+          </p:nvPr>
+        </p:nvSpPr>
+        <p:spPr/>
+        <p:txBody>
+          <a:bodyPr/>
+          <a:lstStyle/>
+          <a:p>
+            <a:fld id="{0E4A4668-A9A2-4DF8-8D7F-FF1880A060EE}" type="slidenum">
+              <a:rPr lang="de-CH" smtClean="0"/>
+              <a:t>7</a:t>
+            </a:fld>
+            <a:endParaRPr lang="de-CH"/>
+          </a:p>
+        </p:txBody>
+      </p:sp>
+    </p:spTree>
+    <p:extLst>
+      <p:ext uri="{BB962C8B-B14F-4D97-AF65-F5344CB8AC3E}">
+        <p14:creationId xmlns:p14="http://schemas.microsoft.com/office/powerpoint/2010/main" val="3177003082"/>
       </p:ext>
     </p:extLst>
   </p:cSld>
@@ -5370,11 +5454,7 @@
             </a:r>
             <a:r>
               <a:rPr lang="de-CH" sz="2800" dirty="0" smtClean="0"/>
-              <a:t>/</a:t>
-            </a:r>
-            <a:r>
-              <a:rPr lang="de-CH" sz="2800" dirty="0" smtClean="0"/>
-              <a:t>KL25Z</a:t>
+              <a:t>/KL25Z</a:t>
             </a:r>
           </a:p>
           <a:p>
@@ -5386,7 +5466,6 @@
               <a:rPr lang="de-CH" sz="2800" dirty="0" smtClean="0"/>
               <a:t>Quiz</a:t>
             </a:r>
-            <a:endParaRPr lang="de-CH" sz="2800" dirty="0" smtClean="0"/>
           </a:p>
           <a:p>
             <a:pPr marL="342900" indent="-342900">
@@ -5430,13 +5509,13 @@
   <p:clrMapOvr>
     <a:masterClrMapping/>
   </p:clrMapOvr>
-  <mc:AlternateContent xmlns:mc="http://schemas.openxmlformats.org/markup-compatibility/2006">
-    <mc:Choice xmlns:p14="http://schemas.microsoft.com/office/powerpoint/2010/main" Requires="p14">
+  <mc:AlternateContent xmlns:mc="http://schemas.openxmlformats.org/markup-compatibility/2006" xmlns:p14="http://schemas.microsoft.com/office/powerpoint/2010/main">
+    <mc:Choice Requires="p14">
       <p:transition spd="med" p14:dur="700">
         <p:fade/>
       </p:transition>
     </mc:Choice>
-    <mc:Fallback>
+    <mc:Fallback xmlns="">
       <p:transition spd="med">
         <p:fade/>
       </p:transition>
@@ -5694,13 +5773,13 @@
   <p:clrMapOvr>
     <a:masterClrMapping/>
   </p:clrMapOvr>
-  <mc:AlternateContent xmlns:mc="http://schemas.openxmlformats.org/markup-compatibility/2006">
-    <mc:Choice xmlns:p14="http://schemas.microsoft.com/office/powerpoint/2010/main" Requires="p14">
+  <mc:AlternateContent xmlns:mc="http://schemas.openxmlformats.org/markup-compatibility/2006" xmlns:p14="http://schemas.microsoft.com/office/powerpoint/2010/main">
+    <mc:Choice Requires="p14">
       <p:transition spd="med" p14:dur="700">
         <p:fade/>
       </p:transition>
     </mc:Choice>
-    <mc:Fallback>
+    <mc:Fallback xmlns="">
       <p:transition spd="med">
         <p:fade/>
       </p:transition>
@@ -6157,13 +6236,13 @@
   <p:clrMapOvr>
     <a:masterClrMapping/>
   </p:clrMapOvr>
-  <mc:AlternateContent xmlns:mc="http://schemas.openxmlformats.org/markup-compatibility/2006">
-    <mc:Choice xmlns:p14="http://schemas.microsoft.com/office/powerpoint/2010/main" Requires="p14">
+  <mc:AlternateContent xmlns:mc="http://schemas.openxmlformats.org/markup-compatibility/2006" xmlns:p14="http://schemas.microsoft.com/office/powerpoint/2010/main">
+    <mc:Choice Requires="p14">
       <p:transition spd="med" p14:dur="700">
         <p:fade/>
       </p:transition>
     </mc:Choice>
-    <mc:Fallback>
+    <mc:Fallback xmlns="">
       <p:transition spd="med">
         <p:fade/>
       </p:transition>
@@ -6614,13 +6693,13 @@
   <p:clrMapOvr>
     <a:masterClrMapping/>
   </p:clrMapOvr>
-  <mc:AlternateContent xmlns:mc="http://schemas.openxmlformats.org/markup-compatibility/2006">
-    <mc:Choice xmlns:p14="http://schemas.microsoft.com/office/powerpoint/2010/main" Requires="p14">
+  <mc:AlternateContent xmlns:mc="http://schemas.openxmlformats.org/markup-compatibility/2006" xmlns:p14="http://schemas.microsoft.com/office/powerpoint/2010/main">
+    <mc:Choice Requires="p14">
       <p:transition spd="med" p14:dur="700">
         <p:fade/>
       </p:transition>
     </mc:Choice>
-    <mc:Fallback>
+    <mc:Fallback xmlns="">
       <p:transition spd="med">
         <p:fade/>
       </p:transition>
@@ -7384,13 +7463,13 @@
   <p:clrMapOvr>
     <a:masterClrMapping/>
   </p:clrMapOvr>
-  <mc:AlternateContent xmlns:mc="http://schemas.openxmlformats.org/markup-compatibility/2006">
-    <mc:Choice xmlns:p14="http://schemas.microsoft.com/office/powerpoint/2010/main" Requires="p14">
+  <mc:AlternateContent xmlns:mc="http://schemas.openxmlformats.org/markup-compatibility/2006" xmlns:p14="http://schemas.microsoft.com/office/powerpoint/2010/main">
+    <mc:Choice Requires="p14">
       <p:transition spd="med" p14:dur="700">
         <p:fade/>
       </p:transition>
     </mc:Choice>
-    <mc:Fallback>
+    <mc:Fallback xmlns="">
       <p:transition spd="med">
         <p:fade/>
       </p:transition>
@@ -7798,13 +7877,13 @@
   <p:clrMapOvr>
     <a:masterClrMapping/>
   </p:clrMapOvr>
-  <mc:AlternateContent xmlns:mc="http://schemas.openxmlformats.org/markup-compatibility/2006">
-    <mc:Choice xmlns:p14="http://schemas.microsoft.com/office/powerpoint/2010/main" Requires="p14">
+  <mc:AlternateContent xmlns:mc="http://schemas.openxmlformats.org/markup-compatibility/2006" xmlns:p14="http://schemas.microsoft.com/office/powerpoint/2010/main">
+    <mc:Choice Requires="p14">
       <p:transition spd="med" p14:dur="700">
         <p:fade/>
       </p:transition>
     </mc:Choice>
-    <mc:Fallback>
+    <mc:Fallback xmlns="">
       <p:transition spd="med">
         <p:fade/>
       </p:transition>
@@ -7878,9 +7957,16 @@
             <p:ph idx="1"/>
           </p:nvPr>
         </p:nvSpPr>
-        <p:spPr/>
-        <p:txBody>
-          <a:bodyPr/>
+        <p:spPr>
+          <a:xfrm>
+            <a:off x="838200" y="1599846"/>
+            <a:ext cx="10515600" cy="4631619"/>
+          </a:xfrm>
+        </p:spPr>
+        <p:txBody>
+          <a:bodyPr>
+            <a:normAutofit/>
+          </a:bodyPr>
           <a:lstStyle/>
           <a:p>
             <a:endParaRPr lang="de-CH" dirty="0"/>

</xml_diff>

<commit_message>
adding names to presentation; deleting fabian version
</commit_message>
<xml_diff>
--- a/RECAP.pptx
+++ b/RECAP.pptx
@@ -2170,6 +2170,280 @@
           <a:bodyPr/>
           <a:lstStyle/>
           <a:p>
+            <a:r>
+              <a:rPr lang="de-CH" dirty="0" smtClean="0"/>
+              <a:t>-Version Control System</a:t>
+            </a:r>
+          </a:p>
+          <a:p>
+            <a:endParaRPr lang="de-CH" dirty="0" smtClean="0"/>
+          </a:p>
+          <a:p>
+            <a:r>
+              <a:rPr lang="de-CH" dirty="0" smtClean="0"/>
+              <a:t>-</a:t>
+            </a:r>
+            <a:r>
+              <a:rPr lang="de-CH" dirty="0" err="1" smtClean="0"/>
+              <a:t>Several</a:t>
+            </a:r>
+            <a:r>
+              <a:rPr lang="de-CH" dirty="0" smtClean="0"/>
+              <a:t> People </a:t>
+            </a:r>
+            <a:r>
+              <a:rPr lang="de-CH" dirty="0" err="1" smtClean="0"/>
+              <a:t>can</a:t>
+            </a:r>
+            <a:r>
+              <a:rPr lang="de-CH" dirty="0" smtClean="0"/>
+              <a:t> </a:t>
+            </a:r>
+            <a:r>
+              <a:rPr lang="de-CH" dirty="0" err="1" smtClean="0"/>
+              <a:t>work</a:t>
+            </a:r>
+            <a:r>
+              <a:rPr lang="de-CH" dirty="0" smtClean="0"/>
+              <a:t> on </a:t>
+            </a:r>
+            <a:r>
+              <a:rPr lang="de-CH" dirty="0" err="1" smtClean="0"/>
+              <a:t>the</a:t>
+            </a:r>
+            <a:r>
+              <a:rPr lang="de-CH" dirty="0" smtClean="0"/>
+              <a:t> same </a:t>
+            </a:r>
+            <a:r>
+              <a:rPr lang="de-CH" dirty="0" err="1" smtClean="0"/>
+              <a:t>project</a:t>
+            </a:r>
+            <a:r>
+              <a:rPr lang="de-CH" dirty="0" smtClean="0"/>
+              <a:t>.</a:t>
+            </a:r>
+            <a:r>
+              <a:rPr lang="de-CH" baseline="0" dirty="0" smtClean="0"/>
+              <a:t/>
+            </a:r>
+            <a:br>
+              <a:rPr lang="de-CH" baseline="0" dirty="0" smtClean="0"/>
+            </a:br>
+            <a:r>
+              <a:rPr lang="de-CH" baseline="0" dirty="0" smtClean="0"/>
+              <a:t>-Backup </a:t>
+            </a:r>
+            <a:r>
+              <a:rPr lang="de-CH" baseline="0" dirty="0" err="1" smtClean="0"/>
+              <a:t>with</a:t>
+            </a:r>
+            <a:r>
+              <a:rPr lang="de-CH" baseline="0" dirty="0" smtClean="0"/>
+              <a:t> </a:t>
+            </a:r>
+            <a:r>
+              <a:rPr lang="de-CH" baseline="0" dirty="0" err="1" smtClean="0"/>
+              <a:t>datalog</a:t>
+            </a:r>
+            <a:r>
+              <a:rPr lang="de-CH" baseline="0" dirty="0" smtClean="0"/>
+              <a:t> </a:t>
+            </a:r>
+            <a:r>
+              <a:rPr lang="de-CH" baseline="0" dirty="0" err="1" smtClean="0"/>
+              <a:t>available</a:t>
+            </a:r>
+            <a:endParaRPr lang="de-CH" baseline="0" dirty="0" smtClean="0"/>
+          </a:p>
+          <a:p>
+            <a:endParaRPr lang="de-CH" baseline="0" dirty="0" smtClean="0"/>
+          </a:p>
+          <a:p>
+            <a:r>
+              <a:rPr lang="de-CH" baseline="0" dirty="0" smtClean="0"/>
+              <a:t>-</a:t>
+            </a:r>
+            <a:r>
+              <a:rPr lang="de-CH" baseline="0" dirty="0" err="1" smtClean="0"/>
+              <a:t>Because</a:t>
+            </a:r>
+            <a:r>
+              <a:rPr lang="de-CH" baseline="0" dirty="0" smtClean="0"/>
+              <a:t> via </a:t>
+            </a:r>
+            <a:r>
+              <a:rPr lang="de-CH" baseline="0" dirty="0" err="1" smtClean="0"/>
+              <a:t>the</a:t>
+            </a:r>
+            <a:r>
+              <a:rPr lang="de-CH" baseline="0" dirty="0" smtClean="0"/>
+              <a:t> KL25USB </a:t>
+            </a:r>
+            <a:r>
+              <a:rPr lang="de-CH" baseline="0" dirty="0" err="1" smtClean="0"/>
+              <a:t>it’s</a:t>
+            </a:r>
+            <a:r>
+              <a:rPr lang="de-CH" baseline="0" dirty="0" smtClean="0"/>
+              <a:t> not </a:t>
+            </a:r>
+            <a:r>
+              <a:rPr lang="de-CH" baseline="0" dirty="0" err="1" smtClean="0"/>
+              <a:t>possible</a:t>
+            </a:r>
+            <a:r>
+              <a:rPr lang="de-CH" baseline="0" dirty="0" smtClean="0"/>
+              <a:t> </a:t>
+            </a:r>
+            <a:r>
+              <a:rPr lang="de-CH" baseline="0" dirty="0" err="1" smtClean="0"/>
+              <a:t>to</a:t>
+            </a:r>
+            <a:r>
+              <a:rPr lang="de-CH" baseline="0" dirty="0" smtClean="0"/>
+              <a:t> </a:t>
+            </a:r>
+            <a:r>
+              <a:rPr lang="de-CH" baseline="0" dirty="0" err="1" smtClean="0"/>
+              <a:t>debug</a:t>
+            </a:r>
+            <a:endParaRPr lang="de-CH" baseline="0" dirty="0" smtClean="0"/>
+          </a:p>
+          <a:p>
+            <a:endParaRPr lang="de-CH" baseline="0" dirty="0" smtClean="0"/>
+          </a:p>
+          <a:p>
+            <a:r>
+              <a:rPr lang="de-CH" baseline="0" dirty="0" smtClean="0"/>
+              <a:t>-</a:t>
+            </a:r>
+            <a:r>
+              <a:rPr lang="de-CH" baseline="0" dirty="0" err="1" smtClean="0"/>
+              <a:t>Because</a:t>
+            </a:r>
+            <a:r>
+              <a:rPr lang="de-CH" baseline="0" dirty="0" smtClean="0"/>
+              <a:t> </a:t>
+            </a:r>
+            <a:r>
+              <a:rPr lang="de-CH" baseline="0" dirty="0" err="1" smtClean="0"/>
+              <a:t>it’s</a:t>
+            </a:r>
+            <a:r>
+              <a:rPr lang="de-CH" baseline="0" dirty="0" smtClean="0"/>
+              <a:t> not </a:t>
+            </a:r>
+            <a:r>
+              <a:rPr lang="de-CH" baseline="0" dirty="0" err="1" smtClean="0"/>
+              <a:t>compatible</a:t>
+            </a:r>
+            <a:r>
+              <a:rPr lang="de-CH" baseline="0" dirty="0" smtClean="0"/>
+              <a:t> </a:t>
+            </a:r>
+            <a:r>
+              <a:rPr lang="de-CH" baseline="0" dirty="0" err="1" smtClean="0"/>
+              <a:t>with</a:t>
+            </a:r>
+            <a:r>
+              <a:rPr lang="de-CH" baseline="0" dirty="0" smtClean="0"/>
+              <a:t> win8.x </a:t>
+            </a:r>
+            <a:r>
+              <a:rPr lang="de-CH" baseline="0" dirty="0" err="1" smtClean="0"/>
+              <a:t>or</a:t>
+            </a:r>
+            <a:r>
+              <a:rPr lang="de-CH" baseline="0" dirty="0" smtClean="0"/>
+              <a:t> </a:t>
+            </a:r>
+            <a:r>
+              <a:rPr lang="de-CH" baseline="0" dirty="0" err="1" smtClean="0"/>
+              <a:t>later</a:t>
+            </a:r>
+            <a:r>
+              <a:rPr lang="de-CH" baseline="0" dirty="0" smtClean="0"/>
+              <a:t> </a:t>
+            </a:r>
+            <a:r>
+              <a:rPr lang="de-CH" baseline="0" dirty="0" err="1" smtClean="0"/>
+              <a:t>systems</a:t>
+            </a:r>
+            <a:endParaRPr lang="de-CH" baseline="0" dirty="0" smtClean="0"/>
+          </a:p>
+          <a:p>
+            <a:endParaRPr lang="de-CH" baseline="0" dirty="0" smtClean="0"/>
+          </a:p>
+          <a:p>
+            <a:r>
+              <a:rPr lang="de-CH" baseline="0" dirty="0" err="1" smtClean="0"/>
+              <a:t>Recap</a:t>
+            </a:r>
+            <a:r>
+              <a:rPr lang="de-CH" baseline="0" dirty="0" smtClean="0"/>
+              <a:t>, </a:t>
+            </a:r>
+            <a:r>
+              <a:rPr lang="de-CH" baseline="0" dirty="0" err="1" smtClean="0"/>
+              <a:t>Lessons</a:t>
+            </a:r>
+            <a:r>
+              <a:rPr lang="de-CH" baseline="0" dirty="0" smtClean="0"/>
+              <a:t> </a:t>
+            </a:r>
+            <a:r>
+              <a:rPr lang="de-CH" baseline="0" dirty="0" err="1" smtClean="0"/>
+              <a:t>Learned</a:t>
+            </a:r>
+            <a:r>
+              <a:rPr lang="de-CH" baseline="0" dirty="0" smtClean="0"/>
+              <a:t>, </a:t>
+            </a:r>
+            <a:r>
+              <a:rPr lang="de-CH" baseline="0" dirty="0" err="1" smtClean="0"/>
+              <a:t>solve</a:t>
+            </a:r>
+            <a:r>
+              <a:rPr lang="de-CH" baseline="0" dirty="0" smtClean="0"/>
+              <a:t> </a:t>
+            </a:r>
+            <a:r>
+              <a:rPr lang="de-CH" baseline="0" dirty="0" err="1" smtClean="0"/>
+              <a:t>the</a:t>
+            </a:r>
+            <a:r>
+              <a:rPr lang="de-CH" baseline="0" dirty="0" smtClean="0"/>
+              <a:t> </a:t>
+            </a:r>
+            <a:r>
+              <a:rPr lang="de-CH" baseline="0" dirty="0" err="1" smtClean="0"/>
+              <a:t>maze</a:t>
+            </a:r>
+            <a:r>
+              <a:rPr lang="de-CH" baseline="0" dirty="0" smtClean="0"/>
+              <a:t> </a:t>
+            </a:r>
+            <a:r>
+              <a:rPr lang="de-CH" baseline="0" dirty="0" err="1" smtClean="0"/>
+              <a:t>with</a:t>
+            </a:r>
+            <a:r>
+              <a:rPr lang="de-CH" baseline="0" dirty="0" smtClean="0"/>
+              <a:t> </a:t>
+            </a:r>
+            <a:r>
+              <a:rPr lang="de-CH" baseline="0" dirty="0" err="1" smtClean="0"/>
+              <a:t>the</a:t>
+            </a:r>
+            <a:r>
+              <a:rPr lang="de-CH" baseline="0" dirty="0" smtClean="0"/>
+              <a:t> bot in </a:t>
+            </a:r>
+            <a:r>
+              <a:rPr lang="de-CH" baseline="0" smtClean="0"/>
+              <a:t>competition</a:t>
+            </a:r>
             <a:endParaRPr lang="de-CH" baseline="0" dirty="0" smtClean="0"/>
           </a:p>
         </p:txBody>
@@ -5126,8 +5400,9 @@
           <a:p>
             <a:r>
               <a:rPr lang="de-CH" dirty="0" smtClean="0"/>
-              <a:t>Fabian, Ueli</a:t>
-            </a:r>
+              <a:t>Fabian Niederberger, Ueli Leber</a:t>
+            </a:r>
+            <a:endParaRPr lang="de-CH" dirty="0" smtClean="0"/>
           </a:p>
           <a:p>
             <a:endParaRPr lang="de-CH" dirty="0" smtClean="0"/>
@@ -7965,10 +8240,326 @@
         </p:spPr>
         <p:txBody>
           <a:bodyPr>
-            <a:normAutofit/>
+            <a:normAutofit lnSpcReduction="10000"/>
           </a:bodyPr>
           <a:lstStyle/>
           <a:p>
+            <a:r>
+              <a:rPr lang="de-CH" dirty="0" err="1" smtClean="0"/>
+              <a:t>What</a:t>
+            </a:r>
+            <a:r>
+              <a:rPr lang="de-CH" dirty="0" smtClean="0"/>
+              <a:t> </a:t>
+            </a:r>
+            <a:r>
+              <a:rPr lang="de-CH" dirty="0" err="1" smtClean="0"/>
+              <a:t>meaning</a:t>
+            </a:r>
+            <a:r>
+              <a:rPr lang="de-CH" dirty="0" smtClean="0"/>
+              <a:t> </a:t>
+            </a:r>
+            <a:r>
+              <a:rPr lang="de-CH" dirty="0" err="1" smtClean="0"/>
+              <a:t>have</a:t>
+            </a:r>
+            <a:r>
+              <a:rPr lang="de-CH" dirty="0" smtClean="0"/>
+              <a:t> </a:t>
+            </a:r>
+            <a:r>
+              <a:rPr lang="de-CH" dirty="0" err="1" smtClean="0"/>
+              <a:t>the</a:t>
+            </a:r>
+            <a:r>
+              <a:rPr lang="de-CH" dirty="0" smtClean="0"/>
+              <a:t> </a:t>
+            </a:r>
+            <a:r>
+              <a:rPr lang="de-CH" dirty="0" err="1" smtClean="0"/>
+              <a:t>letters</a:t>
+            </a:r>
+            <a:r>
+              <a:rPr lang="de-CH" dirty="0" smtClean="0"/>
+              <a:t> VCS?</a:t>
+            </a:r>
+          </a:p>
+          <a:p>
+            <a:endParaRPr lang="de-CH" dirty="0" smtClean="0"/>
+          </a:p>
+          <a:p>
+            <a:r>
+              <a:rPr lang="de-CH" dirty="0" err="1" smtClean="0"/>
+              <a:t>What</a:t>
+            </a:r>
+            <a:r>
+              <a:rPr lang="de-CH" dirty="0" smtClean="0"/>
+              <a:t> </a:t>
+            </a:r>
+            <a:r>
+              <a:rPr lang="de-CH" dirty="0" err="1" smtClean="0"/>
+              <a:t>are</a:t>
+            </a:r>
+            <a:r>
+              <a:rPr lang="de-CH" dirty="0" smtClean="0"/>
+              <a:t> </a:t>
+            </a:r>
+            <a:r>
+              <a:rPr lang="de-CH" dirty="0" err="1" smtClean="0"/>
+              <a:t>the</a:t>
+            </a:r>
+            <a:r>
+              <a:rPr lang="de-CH" dirty="0" smtClean="0"/>
+              <a:t> </a:t>
+            </a:r>
+            <a:r>
+              <a:rPr lang="de-CH" dirty="0" err="1" smtClean="0"/>
+              <a:t>advantages</a:t>
+            </a:r>
+            <a:r>
+              <a:rPr lang="de-CH" dirty="0" smtClean="0"/>
+              <a:t> </a:t>
+            </a:r>
+            <a:r>
+              <a:rPr lang="de-CH" dirty="0" err="1" smtClean="0"/>
+              <a:t>of</a:t>
+            </a:r>
+            <a:r>
+              <a:rPr lang="de-CH" dirty="0" smtClean="0"/>
+              <a:t> a VCS?</a:t>
+            </a:r>
+          </a:p>
+          <a:p>
+            <a:endParaRPr lang="de-CH" dirty="0"/>
+          </a:p>
+          <a:p>
+            <a:r>
+              <a:rPr lang="de-CH" dirty="0" err="1"/>
+              <a:t>W</a:t>
+            </a:r>
+            <a:r>
+              <a:rPr lang="de-CH" dirty="0" err="1" smtClean="0"/>
+              <a:t>e</a:t>
+            </a:r>
+            <a:r>
+              <a:rPr lang="de-CH" dirty="0" smtClean="0"/>
+              <a:t> </a:t>
+            </a:r>
+            <a:r>
+              <a:rPr lang="de-CH" dirty="0" err="1" smtClean="0"/>
+              <a:t>are</a:t>
+            </a:r>
+            <a:r>
+              <a:rPr lang="de-CH" dirty="0" smtClean="0"/>
+              <a:t> not </a:t>
+            </a:r>
+            <a:r>
+              <a:rPr lang="de-CH" dirty="0" err="1" smtClean="0"/>
+              <a:t>programing</a:t>
+            </a:r>
+            <a:r>
+              <a:rPr lang="de-CH" dirty="0" smtClean="0"/>
+              <a:t> </a:t>
+            </a:r>
+            <a:r>
+              <a:rPr lang="de-CH" dirty="0" err="1" smtClean="0"/>
+              <a:t>the</a:t>
+            </a:r>
+            <a:r>
+              <a:rPr lang="de-CH" dirty="0" smtClean="0"/>
+              <a:t> FRDM </a:t>
+            </a:r>
+            <a:r>
+              <a:rPr lang="de-CH" smtClean="0"/>
+              <a:t>Boardvia</a:t>
+            </a:r>
+            <a:r>
+              <a:rPr lang="de-CH" dirty="0" smtClean="0"/>
+              <a:t> KL25Z USB </a:t>
+            </a:r>
+            <a:r>
+              <a:rPr lang="de-CH" dirty="0" err="1" smtClean="0"/>
+              <a:t>instead</a:t>
+            </a:r>
+            <a:r>
+              <a:rPr lang="de-CH" dirty="0" smtClean="0"/>
+              <a:t> </a:t>
+            </a:r>
+            <a:r>
+              <a:rPr lang="de-CH" dirty="0" err="1" smtClean="0"/>
+              <a:t>we</a:t>
+            </a:r>
+            <a:r>
+              <a:rPr lang="de-CH" dirty="0" smtClean="0"/>
+              <a:t> </a:t>
+            </a:r>
+            <a:r>
+              <a:rPr lang="de-CH" dirty="0" err="1" smtClean="0"/>
+              <a:t>program</a:t>
+            </a:r>
+            <a:r>
+              <a:rPr lang="de-CH" dirty="0" smtClean="0"/>
+              <a:t> via </a:t>
+            </a:r>
+            <a:r>
+              <a:rPr lang="de-CH" dirty="0" err="1" smtClean="0"/>
+              <a:t>OpenSDA</a:t>
+            </a:r>
+            <a:r>
+              <a:rPr lang="de-CH" dirty="0" smtClean="0"/>
+              <a:t> USB. </a:t>
+            </a:r>
+            <a:r>
+              <a:rPr lang="de-CH" dirty="0" err="1" smtClean="0"/>
+              <a:t>Why</a:t>
+            </a:r>
+            <a:r>
+              <a:rPr lang="de-CH" dirty="0" smtClean="0"/>
+              <a:t>?</a:t>
+            </a:r>
+          </a:p>
+          <a:p>
+            <a:endParaRPr lang="de-CH" dirty="0"/>
+          </a:p>
+          <a:p>
+            <a:r>
+              <a:rPr lang="de-CH" dirty="0" smtClean="0"/>
+              <a:t>On </a:t>
+            </a:r>
+            <a:r>
+              <a:rPr lang="de-CH" dirty="0" err="1" smtClean="0"/>
+              <a:t>brand</a:t>
+            </a:r>
+            <a:r>
+              <a:rPr lang="de-CH" dirty="0" smtClean="0"/>
+              <a:t> </a:t>
+            </a:r>
+            <a:r>
+              <a:rPr lang="de-CH" dirty="0" err="1" smtClean="0"/>
+              <a:t>new</a:t>
+            </a:r>
+            <a:r>
+              <a:rPr lang="de-CH" dirty="0" smtClean="0"/>
+              <a:t> FRDM KL25Z </a:t>
+            </a:r>
+            <a:r>
+              <a:rPr lang="de-CH" dirty="0" err="1" smtClean="0"/>
+              <a:t>boards</a:t>
+            </a:r>
+            <a:r>
+              <a:rPr lang="de-CH" dirty="0" smtClean="0"/>
+              <a:t> </a:t>
+            </a:r>
+            <a:r>
+              <a:rPr lang="de-CH" dirty="0" err="1" smtClean="0"/>
+              <a:t>we</a:t>
+            </a:r>
+            <a:r>
+              <a:rPr lang="de-CH" dirty="0" smtClean="0"/>
+              <a:t> update </a:t>
+            </a:r>
+            <a:r>
+              <a:rPr lang="de-CH" dirty="0" err="1" smtClean="0"/>
+              <a:t>the</a:t>
+            </a:r>
+            <a:r>
+              <a:rPr lang="de-CH" dirty="0" smtClean="0"/>
+              <a:t> </a:t>
+            </a:r>
+            <a:r>
+              <a:rPr lang="de-CH" dirty="0" err="1" smtClean="0"/>
+              <a:t>bootloader</a:t>
+            </a:r>
+            <a:r>
+              <a:rPr lang="de-CH" dirty="0" smtClean="0"/>
+              <a:t>. </a:t>
+            </a:r>
+            <a:r>
+              <a:rPr lang="de-CH" dirty="0" err="1" smtClean="0"/>
+              <a:t>Why</a:t>
+            </a:r>
+            <a:r>
+              <a:rPr lang="de-CH" dirty="0" smtClean="0"/>
+              <a:t>?</a:t>
+            </a:r>
+          </a:p>
+          <a:p>
+            <a:endParaRPr lang="de-CH" dirty="0"/>
+          </a:p>
+          <a:p>
+            <a:r>
+              <a:rPr lang="de-CH" dirty="0" err="1" smtClean="0"/>
+              <a:t>What</a:t>
+            </a:r>
+            <a:r>
+              <a:rPr lang="de-CH" dirty="0" smtClean="0"/>
+              <a:t> </a:t>
+            </a:r>
+            <a:r>
+              <a:rPr lang="de-CH" dirty="0" err="1" smtClean="0"/>
+              <a:t>are</a:t>
+            </a:r>
+            <a:r>
+              <a:rPr lang="de-CH" dirty="0" smtClean="0"/>
+              <a:t> </a:t>
+            </a:r>
+            <a:r>
+              <a:rPr lang="de-CH" dirty="0" err="1" smtClean="0"/>
+              <a:t>the</a:t>
+            </a:r>
+            <a:r>
+              <a:rPr lang="de-CH" dirty="0" smtClean="0"/>
+              <a:t> </a:t>
+            </a:r>
+            <a:r>
+              <a:rPr lang="de-CH" dirty="0" err="1" smtClean="0"/>
+              <a:t>three</a:t>
+            </a:r>
+            <a:r>
+              <a:rPr lang="de-CH" dirty="0" smtClean="0"/>
+              <a:t> </a:t>
+            </a:r>
+            <a:r>
+              <a:rPr lang="de-CH" dirty="0" err="1" smtClean="0"/>
+              <a:t>testats</a:t>
+            </a:r>
+            <a:r>
+              <a:rPr lang="de-CH" dirty="0" smtClean="0"/>
+              <a:t> </a:t>
+            </a:r>
+            <a:r>
+              <a:rPr lang="de-CH" dirty="0" err="1" smtClean="0"/>
+              <a:t>you</a:t>
+            </a:r>
+            <a:r>
+              <a:rPr lang="de-CH" dirty="0" smtClean="0"/>
+              <a:t> </a:t>
+            </a:r>
+            <a:r>
+              <a:rPr lang="de-CH" dirty="0" err="1" smtClean="0"/>
+              <a:t>have</a:t>
+            </a:r>
+            <a:r>
+              <a:rPr lang="de-CH" dirty="0" smtClean="0"/>
+              <a:t> </a:t>
+            </a:r>
+            <a:r>
+              <a:rPr lang="de-CH" dirty="0" err="1" smtClean="0"/>
+              <a:t>to</a:t>
+            </a:r>
+            <a:r>
+              <a:rPr lang="de-CH" dirty="0" smtClean="0"/>
+              <a:t> </a:t>
+            </a:r>
+            <a:r>
+              <a:rPr lang="de-CH" dirty="0" err="1" smtClean="0"/>
+              <a:t>achieve</a:t>
+            </a:r>
+            <a:r>
+              <a:rPr lang="de-CH" dirty="0" smtClean="0"/>
+              <a:t>?</a:t>
+            </a:r>
             <a:endParaRPr lang="de-CH" dirty="0"/>
           </a:p>
         </p:txBody>

</xml_diff>